<commit_message>
update scrum update folien
</commit_message>
<xml_diff>
--- a/doc/task-07/Task07.pptx
+++ b/doc/task-07/Task07.pptx
@@ -5,22 +5,23 @@
     <p:sldMasterId id="2147483669" r:id="rId4"/>
   </p:sldMasterIdLst>
   <p:notesMasterIdLst>
-    <p:notesMasterId r:id="rId18"/>
+    <p:notesMasterId r:id="rId19"/>
   </p:notesMasterIdLst>
   <p:sldIdLst>
     <p:sldId id="256" r:id="rId5"/>
     <p:sldId id="258" r:id="rId6"/>
     <p:sldId id="260" r:id="rId7"/>
-    <p:sldId id="259" r:id="rId8"/>
-    <p:sldId id="298" r:id="rId9"/>
-    <p:sldId id="301" r:id="rId10"/>
-    <p:sldId id="300" r:id="rId11"/>
-    <p:sldId id="299" r:id="rId12"/>
-    <p:sldId id="295" r:id="rId13"/>
+    <p:sldId id="301" r:id="rId8"/>
+    <p:sldId id="300" r:id="rId9"/>
+    <p:sldId id="299" r:id="rId10"/>
+    <p:sldId id="295" r:id="rId11"/>
+    <p:sldId id="302" r:id="rId12"/>
+    <p:sldId id="305" r:id="rId13"/>
     <p:sldId id="296" r:id="rId14"/>
-    <p:sldId id="302" r:id="rId15"/>
-    <p:sldId id="264" r:id="rId16"/>
-    <p:sldId id="265" r:id="rId17"/>
+    <p:sldId id="264" r:id="rId15"/>
+    <p:sldId id="265" r:id="rId16"/>
+    <p:sldId id="303" r:id="rId17"/>
+    <p:sldId id="304" r:id="rId18"/>
   </p:sldIdLst>
   <p:sldSz cx="12207875" cy="6858000"/>
   <p:notesSz cx="6797675" cy="9872663"/>
@@ -818,52 +819,6 @@
           <a:bodyPr/>
           <a:lstStyle/>
           <a:p>
-            <a:r>
-              <a:rPr lang="de-DE" sz="1200" b="0" i="0" u="none" strike="noStrike" kern="1200" baseline="0" dirty="0">
-                <a:solidFill>
-                  <a:schemeClr val="tx1"/>
-                </a:solidFill>
-                <a:latin typeface="+mn-lt"/>
-                <a:ea typeface="+mn-ea"/>
-                <a:cs typeface="+mn-cs"/>
-              </a:rPr>
-              <a:t>Im Rahmen der Case Study 2, beziehungsweise der Aufgabe 1 «Design </a:t>
-            </a:r>
-            <a:r>
-              <a:rPr lang="de-DE" sz="1200" b="0" i="0" u="none" strike="noStrike" kern="1200" baseline="0" dirty="0" err="1">
-                <a:solidFill>
-                  <a:schemeClr val="tx1"/>
-                </a:solidFill>
-                <a:latin typeface="+mn-lt"/>
-                <a:ea typeface="+mn-ea"/>
-                <a:cs typeface="+mn-cs"/>
-              </a:rPr>
-              <a:t>Thinking</a:t>
-            </a:r>
-            <a:r>
-              <a:rPr lang="de-DE" sz="1200" b="0" i="0" u="none" strike="noStrike" kern="1200" baseline="0" dirty="0">
-                <a:solidFill>
-                  <a:schemeClr val="tx1"/>
-                </a:solidFill>
-                <a:latin typeface="+mn-lt"/>
-                <a:ea typeface="+mn-ea"/>
-                <a:cs typeface="+mn-cs"/>
-              </a:rPr>
-              <a:t>» im Modul BTX8081 - Software Engineering and Design entwerfen wir eine Web-Applikation zum Thema Patienten-Management-System. Das Ziel ist eine Webapplikation, die den Arzt bei der Behandlung von Patienten mit Suchterkrankungen unterstützt, dies aus dem Blickwinkel des Arztes. Die Ausgangslage ist im Anhang gekürzt und strukturiert ersichtlich. </a:t>
-            </a:r>
-          </a:p>
-          <a:p>
-            <a:r>
-              <a:rPr lang="de-DE" sz="1200" b="0" i="0" u="none" strike="noStrike" kern="1200" baseline="0" dirty="0">
-                <a:solidFill>
-                  <a:schemeClr val="tx1"/>
-                </a:solidFill>
-                <a:latin typeface="+mn-lt"/>
-                <a:ea typeface="+mn-ea"/>
-                <a:cs typeface="+mn-cs"/>
-              </a:rPr>
-              <a:t>Übergeordnete Ziele sind die Behandlung der Patienten zu erleichtern indem Informationen rechtzeitig dem Arzt zur Verfügung gestellt werden, sowie die Unterstützung von Patienten und deren Angehörigen bei der Bewältigung der Erkrankung. </a:t>
-            </a:r>
             <a:endParaRPr lang="de-CH" dirty="0"/>
           </a:p>
         </p:txBody>
@@ -891,7 +846,7 @@
               <a:pPr>
                 <a:defRPr/>
               </a:pPr>
-              <a:t>4</a:t>
+              <a:t>5</a:t>
             </a:fld>
             <a:endParaRPr lang="de-CH"/>
           </a:p>
@@ -900,7 +855,7 @@
     </p:spTree>
     <p:extLst>
       <p:ext uri="{BB962C8B-B14F-4D97-AF65-F5344CB8AC3E}">
-        <p14:creationId xmlns:p14="http://schemas.microsoft.com/office/powerpoint/2010/main" val="1824871755"/>
+        <p14:creationId xmlns:p14="http://schemas.microsoft.com/office/powerpoint/2010/main" val="1802605468"/>
       </p:ext>
     </p:extLst>
   </p:cSld>
@@ -954,7 +909,7 @@
           <a:bodyPr/>
           <a:lstStyle/>
           <a:p>
-            <a:endParaRPr lang="de-CH" dirty="0"/>
+            <a:endParaRPr lang="de-DE" dirty="0"/>
           </a:p>
         </p:txBody>
       </p:sp>
@@ -981,7 +936,7 @@
               <a:pPr>
                 <a:defRPr/>
               </a:pPr>
-              <a:t>5</a:t>
+              <a:t>9</a:t>
             </a:fld>
             <a:endParaRPr lang="de-CH"/>
           </a:p>
@@ -990,7 +945,7 @@
     </p:spTree>
     <p:extLst>
       <p:ext uri="{BB962C8B-B14F-4D97-AF65-F5344CB8AC3E}">
-        <p14:creationId xmlns:p14="http://schemas.microsoft.com/office/powerpoint/2010/main" val="305639529"/>
+        <p14:creationId xmlns:p14="http://schemas.microsoft.com/office/powerpoint/2010/main" val="3597307110"/>
       </p:ext>
     </p:extLst>
   </p:cSld>
@@ -1044,7 +999,22 @@
           <a:bodyPr/>
           <a:lstStyle/>
           <a:p>
-            <a:endParaRPr lang="de-CH" dirty="0"/>
+            <a:r>
+              <a:rPr lang="de-CH" dirty="0" err="1"/>
+              <a:t>Product</a:t>
+            </a:r>
+            <a:r>
+              <a:rPr lang="de-CH" dirty="0"/>
+              <a:t> </a:t>
+            </a:r>
+            <a:r>
+              <a:rPr lang="de-CH" dirty="0" err="1"/>
+              <a:t>backlog</a:t>
+            </a:r>
+            <a:r>
+              <a:rPr lang="de-CH" dirty="0"/>
+              <a:t> aktualisieren</a:t>
+            </a:r>
           </a:p>
         </p:txBody>
       </p:sp>
@@ -1071,7 +1041,7 @@
               <a:pPr>
                 <a:defRPr/>
               </a:pPr>
-              <a:t>7</a:t>
+              <a:t>11</a:t>
             </a:fld>
             <a:endParaRPr lang="de-CH"/>
           </a:p>
@@ -1080,7 +1050,7 @@
     </p:spTree>
     <p:extLst>
       <p:ext uri="{BB962C8B-B14F-4D97-AF65-F5344CB8AC3E}">
-        <p14:creationId xmlns:p14="http://schemas.microsoft.com/office/powerpoint/2010/main" val="1802605468"/>
+        <p14:creationId xmlns:p14="http://schemas.microsoft.com/office/powerpoint/2010/main" val="2020155928"/>
       </p:ext>
     </p:extLst>
   </p:cSld>
@@ -1134,22 +1104,7 @@
           <a:bodyPr/>
           <a:lstStyle/>
           <a:p>
-            <a:r>
-              <a:rPr lang="de-CH" dirty="0" err="1"/>
-              <a:t>Product</a:t>
-            </a:r>
-            <a:r>
-              <a:rPr lang="de-CH" dirty="0"/>
-              <a:t> </a:t>
-            </a:r>
-            <a:r>
-              <a:rPr lang="de-CH" dirty="0" err="1"/>
-              <a:t>backlog</a:t>
-            </a:r>
-            <a:r>
-              <a:rPr lang="de-CH" dirty="0"/>
-              <a:t> aktualisieren</a:t>
-            </a:r>
+            <a:endParaRPr lang="de-DE" dirty="0"/>
           </a:p>
         </p:txBody>
       </p:sp>
@@ -1176,7 +1131,7 @@
               <a:pPr>
                 <a:defRPr/>
               </a:pPr>
-              <a:t>12</a:t>
+              <a:t>14</a:t>
             </a:fld>
             <a:endParaRPr lang="de-CH"/>
           </a:p>
@@ -1185,7 +1140,7 @@
     </p:spTree>
     <p:extLst>
       <p:ext uri="{BB962C8B-B14F-4D97-AF65-F5344CB8AC3E}">
-        <p14:creationId xmlns:p14="http://schemas.microsoft.com/office/powerpoint/2010/main" val="2020155928"/>
+        <p14:creationId xmlns:p14="http://schemas.microsoft.com/office/powerpoint/2010/main" val="1418824149"/>
       </p:ext>
     </p:extLst>
   </p:cSld>
@@ -7737,41 +7692,10 @@
       </p:grpSpPr>
       <p:sp>
         <p:nvSpPr>
-          <p:cNvPr id="2" name="Inhaltsplatzhalter 1">
-            <a:extLst>
-              <a:ext uri="{FF2B5EF4-FFF2-40B4-BE49-F238E27FC236}">
-                <a16:creationId xmlns:a16="http://schemas.microsoft.com/office/drawing/2014/main" id="{19572D01-E7C4-4B81-9FCD-595177684BEA}"/>
-              </a:ext>
-            </a:extLst>
-          </p:cNvPr>
-          <p:cNvSpPr>
-            <a:spLocks noGrp="1"/>
-          </p:cNvSpPr>
-          <p:nvPr>
-            <p:ph sz="half" idx="1"/>
-          </p:nvPr>
-        </p:nvSpPr>
-        <p:spPr/>
-        <p:txBody>
-          <a:bodyPr/>
-          <a:lstStyle/>
-          <a:p>
-            <a:r>
-              <a:rPr lang="de-CH" dirty="0"/>
-              <a:t>Titelbild: https://image.jimcdn.com/app/cms/image/transf/dimension=697x10000:format=jpg/path/sd47613ceb1db53f4/image/ib674891e8fb5286a/version/1515513892/patientenzimmer-untersuchungszimmer-praxis-hausarzt-friedeck-rothenburg.jpg</a:t>
-            </a:r>
-          </a:p>
-          <a:p>
-            <a:endParaRPr lang="de-CH" dirty="0"/>
-          </a:p>
-        </p:txBody>
-      </p:sp>
-      <p:sp>
-        <p:nvSpPr>
           <p:cNvPr id="3" name="Titel 2">
             <a:extLst>
               <a:ext uri="{FF2B5EF4-FFF2-40B4-BE49-F238E27FC236}">
-                <a16:creationId xmlns:a16="http://schemas.microsoft.com/office/drawing/2014/main" id="{93DE674A-067F-4DB4-9443-098DF8E86245}"/>
+                <a16:creationId xmlns:a16="http://schemas.microsoft.com/office/drawing/2014/main" id="{2A1A9CE2-A825-4C4E-B2DA-537B6B482230}"/>
               </a:ext>
             </a:extLst>
           </p:cNvPr>
@@ -7788,16 +7712,54 @@
           <a:lstStyle/>
           <a:p>
             <a:r>
+              <a:rPr lang="de-CH" dirty="0" err="1"/>
+              <a:t>Product</a:t>
+            </a:r>
+            <a:r>
               <a:rPr lang="de-CH" dirty="0"/>
-              <a:t>Bilderquellen</a:t>
-            </a:r>
-          </a:p>
-        </p:txBody>
-      </p:sp>
+              <a:t> </a:t>
+            </a:r>
+            <a:r>
+              <a:rPr lang="de-CH" dirty="0" err="1"/>
+              <a:t>Backlog</a:t>
+            </a:r>
+            <a:endParaRPr lang="de-CH" dirty="0"/>
+          </a:p>
+        </p:txBody>
+      </p:sp>
+      <p:pic>
+        <p:nvPicPr>
+          <p:cNvPr id="6" name="Inhaltsplatzhalter 5" descr="Ein Bild, das Screenshot, Anzeige enthält.&#10;&#10;Automatisch generierte Beschreibung">
+            <a:extLst>
+              <a:ext uri="{FF2B5EF4-FFF2-40B4-BE49-F238E27FC236}">
+                <a16:creationId xmlns:a16="http://schemas.microsoft.com/office/drawing/2014/main" id="{85F5CABD-1879-D649-9D7A-6E10DE86832F}"/>
+              </a:ext>
+            </a:extLst>
+          </p:cNvPr>
+          <p:cNvPicPr>
+            <a:picLocks noGrp="1" noChangeAspect="1"/>
+          </p:cNvPicPr>
+          <p:nvPr>
+            <p:ph sz="half" idx="1"/>
+          </p:nvPr>
+        </p:nvPicPr>
+        <p:blipFill>
+          <a:blip r:embed="rId3"/>
+          <a:stretch>
+            <a:fillRect/>
+          </a:stretch>
+        </p:blipFill>
+        <p:spPr>
+          <a:xfrm>
+            <a:off x="836023" y="989348"/>
+            <a:ext cx="9834707" cy="5130465"/>
+          </a:xfrm>
+        </p:spPr>
+      </p:pic>
     </p:spTree>
     <p:extLst>
       <p:ext uri="{BB962C8B-B14F-4D97-AF65-F5344CB8AC3E}">
-        <p14:creationId xmlns:p14="http://schemas.microsoft.com/office/powerpoint/2010/main" val="640674437"/>
+        <p14:creationId xmlns:p14="http://schemas.microsoft.com/office/powerpoint/2010/main" val="3826076777"/>
       </p:ext>
     </p:extLst>
   </p:cSld>
@@ -7846,53 +7808,54 @@
           <a:lstStyle/>
           <a:p>
             <a:r>
+              <a:rPr lang="de-CH" dirty="0"/>
+              <a:t>Sprint </a:t>
+            </a:r>
+            <a:r>
               <a:rPr lang="de-CH" dirty="0" err="1"/>
-              <a:t>Product</a:t>
+              <a:t>Backlog</a:t>
             </a:r>
             <a:r>
               <a:rPr lang="de-CH" dirty="0"/>
-              <a:t> </a:t>
-            </a:r>
-            <a:r>
-              <a:rPr lang="de-CH" dirty="0" err="1"/>
-              <a:t>backlog</a:t>
-            </a:r>
-            <a:endParaRPr lang="de-CH" dirty="0"/>
+              <a:t> 1</a:t>
+            </a:r>
           </a:p>
         </p:txBody>
       </p:sp>
       <p:pic>
         <p:nvPicPr>
-          <p:cNvPr id="9" name="Inhaltsplatzhalter 8" descr="Ein Bild, das Screenshot enthält.&#10;&#10;Automatisch generierte Beschreibung">
+          <p:cNvPr id="4" name="Grafik 3" descr="Ein Bild, das Screenshot, Anzeige enthält.&#10;&#10;Automatisch generierte Beschreibung">
             <a:extLst>
               <a:ext uri="{FF2B5EF4-FFF2-40B4-BE49-F238E27FC236}">
-                <a16:creationId xmlns:a16="http://schemas.microsoft.com/office/drawing/2014/main" id="{FEDEC564-8FCF-F549-955A-FA8E13F8AECF}"/>
+                <a16:creationId xmlns:a16="http://schemas.microsoft.com/office/drawing/2014/main" id="{51DDEA9F-25CA-8C45-A486-29CC128458C3}"/>
               </a:ext>
             </a:extLst>
           </p:cNvPr>
           <p:cNvPicPr>
-            <a:picLocks noGrp="1" noChangeAspect="1"/>
+            <a:picLocks noChangeAspect="1"/>
           </p:cNvPicPr>
-          <p:nvPr>
-            <p:ph sz="half" idx="1"/>
-          </p:nvPr>
+          <p:nvPr/>
         </p:nvPicPr>
-        <p:blipFill rotWithShape="1">
-          <a:blip r:embed="rId3"/>
-          <a:srcRect l="436" t="803" r="389" b="1081"/>
-          <a:stretch/>
+        <p:blipFill>
+          <a:blip r:embed="rId2"/>
+          <a:stretch>
+            <a:fillRect/>
+          </a:stretch>
         </p:blipFill>
         <p:spPr>
           <a:xfrm>
-            <a:off x="457200" y="943520"/>
-            <a:ext cx="10090433" cy="5311675"/>
+            <a:off x="555438" y="1711234"/>
+            <a:ext cx="11652438" cy="3607490"/>
           </a:xfrm>
+          <a:prstGeom prst="rect">
+            <a:avLst/>
+          </a:prstGeom>
         </p:spPr>
       </p:pic>
     </p:spTree>
     <p:extLst>
       <p:ext uri="{BB962C8B-B14F-4D97-AF65-F5344CB8AC3E}">
-        <p14:creationId xmlns:p14="http://schemas.microsoft.com/office/powerpoint/2010/main" val="3826076777"/>
+        <p14:creationId xmlns:p14="http://schemas.microsoft.com/office/powerpoint/2010/main" val="684438622"/>
       </p:ext>
     </p:extLst>
   </p:cSld>
@@ -7946,18 +7909,21 @@
             </a:r>
             <a:r>
               <a:rPr lang="de-CH" dirty="0" err="1"/>
-              <a:t>backlog</a:t>
-            </a:r>
-            <a:endParaRPr lang="de-CH" dirty="0"/>
+              <a:t>Backlog</a:t>
+            </a:r>
+            <a:r>
+              <a:rPr lang="de-CH" dirty="0"/>
+              <a:t> 2</a:t>
+            </a:r>
           </a:p>
         </p:txBody>
       </p:sp>
       <p:pic>
         <p:nvPicPr>
-          <p:cNvPr id="5" name="Inhaltsplatzhalter 12" descr="Ein Bild, das Screenshot enthält.&#10;&#10;Automatisch generierte Beschreibung">
+          <p:cNvPr id="4" name="Grafik 3" descr="Ein Bild, das Screenshot enthält.&#10;&#10;Automatisch generierte Beschreibung">
             <a:extLst>
               <a:ext uri="{FF2B5EF4-FFF2-40B4-BE49-F238E27FC236}">
-                <a16:creationId xmlns:a16="http://schemas.microsoft.com/office/drawing/2014/main" id="{609956C9-1ECD-2E4B-87D9-C5B93CCC6BB9}"/>
+                <a16:creationId xmlns:a16="http://schemas.microsoft.com/office/drawing/2014/main" id="{F1F2B6A8-317A-6A47-A681-7C9617D757FA}"/>
               </a:ext>
             </a:extLst>
           </p:cNvPr>
@@ -7966,15 +7932,16 @@
           </p:cNvPicPr>
           <p:nvPr/>
         </p:nvPicPr>
-        <p:blipFill rotWithShape="1">
+        <p:blipFill>
           <a:blip r:embed="rId2"/>
-          <a:srcRect l="398" t="1269" r="517" b="8430"/>
-          <a:stretch/>
+          <a:stretch>
+            <a:fillRect/>
+          </a:stretch>
         </p:blipFill>
         <p:spPr>
           <a:xfrm>
-            <a:off x="135130" y="1457533"/>
-            <a:ext cx="11937613" cy="3942933"/>
+            <a:off x="143691" y="1189674"/>
+            <a:ext cx="12064184" cy="4532637"/>
           </a:xfrm>
           <a:prstGeom prst="rect">
             <a:avLst/>
@@ -7984,7 +7951,103 @@
     </p:spTree>
     <p:extLst>
       <p:ext uri="{BB962C8B-B14F-4D97-AF65-F5344CB8AC3E}">
-        <p14:creationId xmlns:p14="http://schemas.microsoft.com/office/powerpoint/2010/main" val="684438622"/>
+        <p14:creationId xmlns:p14="http://schemas.microsoft.com/office/powerpoint/2010/main" val="397703565"/>
+      </p:ext>
+    </p:extLst>
+  </p:cSld>
+  <p:clrMapOvr>
+    <a:masterClrMapping/>
+  </p:clrMapOvr>
+</p:sld>
+</file>
+
+<file path=ppt/slides/slide14.xml><?xml version="1.0" encoding="utf-8"?>
+<p:sld xmlns:a="http://schemas.openxmlformats.org/drawingml/2006/main" xmlns:r="http://schemas.openxmlformats.org/officeDocument/2006/relationships" xmlns:p="http://schemas.openxmlformats.org/presentationml/2006/main">
+  <p:cSld>
+    <p:spTree>
+      <p:nvGrpSpPr>
+        <p:cNvPr id="1" name=""/>
+        <p:cNvGrpSpPr/>
+        <p:nvPr/>
+      </p:nvGrpSpPr>
+      <p:grpSpPr>
+        <a:xfrm>
+          <a:off x="0" y="0"/>
+          <a:ext cx="0" cy="0"/>
+          <a:chOff x="0" y="0"/>
+          <a:chExt cx="0" cy="0"/>
+        </a:xfrm>
+      </p:grpSpPr>
+      <p:sp>
+        <p:nvSpPr>
+          <p:cNvPr id="3" name="Titel 2">
+            <a:extLst>
+              <a:ext uri="{FF2B5EF4-FFF2-40B4-BE49-F238E27FC236}">
+                <a16:creationId xmlns:a16="http://schemas.microsoft.com/office/drawing/2014/main" id="{2A1A9CE2-A825-4C4E-B2DA-537B6B482230}"/>
+              </a:ext>
+            </a:extLst>
+          </p:cNvPr>
+          <p:cNvSpPr>
+            <a:spLocks noGrp="1"/>
+          </p:cNvSpPr>
+          <p:nvPr>
+            <p:ph type="ctrTitle"/>
+          </p:nvPr>
+        </p:nvSpPr>
+        <p:spPr/>
+        <p:txBody>
+          <a:bodyPr/>
+          <a:lstStyle/>
+          <a:p>
+            <a:r>
+              <a:rPr lang="de-CH" dirty="0"/>
+              <a:t>Sprint </a:t>
+            </a:r>
+            <a:r>
+              <a:rPr lang="de-CH" dirty="0" err="1"/>
+              <a:t>Backlog</a:t>
+            </a:r>
+            <a:r>
+              <a:rPr lang="de-CH" dirty="0"/>
+              <a:t> 3</a:t>
+            </a:r>
+          </a:p>
+        </p:txBody>
+      </p:sp>
+      <p:pic>
+        <p:nvPicPr>
+          <p:cNvPr id="4" name="Grafik 3" descr="Ein Bild, das Screenshot, Monitor, Bildschirm, groß enthält.&#10;&#10;Automatisch generierte Beschreibung">
+            <a:extLst>
+              <a:ext uri="{FF2B5EF4-FFF2-40B4-BE49-F238E27FC236}">
+                <a16:creationId xmlns:a16="http://schemas.microsoft.com/office/drawing/2014/main" id="{7ED28D68-7B33-2E4D-A559-185E6BF2AD6B}"/>
+              </a:ext>
+            </a:extLst>
+          </p:cNvPr>
+          <p:cNvPicPr>
+            <a:picLocks noChangeAspect="1"/>
+          </p:cNvPicPr>
+          <p:nvPr/>
+        </p:nvPicPr>
+        <p:blipFill>
+          <a:blip r:embed="rId3"/>
+          <a:stretch>
+            <a:fillRect/>
+          </a:stretch>
+        </p:blipFill>
+        <p:spPr>
+          <a:xfrm>
+            <a:off x="282097" y="2398343"/>
+            <a:ext cx="11563067" cy="2061314"/>
+          </a:xfrm>
+          <a:prstGeom prst="rect">
+            <a:avLst/>
+          </a:prstGeom>
+        </p:spPr>
+      </p:pic>
+    </p:spTree>
+    <p:extLst>
+      <p:ext uri="{BB962C8B-B14F-4D97-AF65-F5344CB8AC3E}">
+        <p14:creationId xmlns:p14="http://schemas.microsoft.com/office/powerpoint/2010/main" val="3448055728"/>
       </p:ext>
     </p:extLst>
   </p:cSld>
@@ -8287,7 +8350,7 @@
           <a:bodyPr/>
           <a:lstStyle/>
           <a:p>
-            <a:endParaRPr lang="de-CH"/>
+            <a:endParaRPr lang="de-CH" dirty="0"/>
           </a:p>
         </p:txBody>
       </p:sp>
@@ -8305,312 +8368,6 @@
 </file>
 
 <file path=ppt/slides/slide4.xml><?xml version="1.0" encoding="utf-8"?>
-<p:sld xmlns:a="http://schemas.openxmlformats.org/drawingml/2006/main" xmlns:r="http://schemas.openxmlformats.org/officeDocument/2006/relationships" xmlns:p="http://schemas.openxmlformats.org/presentationml/2006/main">
-  <p:cSld>
-    <p:spTree>
-      <p:nvGrpSpPr>
-        <p:cNvPr id="1" name=""/>
-        <p:cNvGrpSpPr/>
-        <p:nvPr/>
-      </p:nvGrpSpPr>
-      <p:grpSpPr>
-        <a:xfrm>
-          <a:off x="0" y="0"/>
-          <a:ext cx="0" cy="0"/>
-          <a:chOff x="0" y="0"/>
-          <a:chExt cx="0" cy="0"/>
-        </a:xfrm>
-      </p:grpSpPr>
-      <p:sp>
-        <p:nvSpPr>
-          <p:cNvPr id="3" name="Titel 2">
-            <a:extLst>
-              <a:ext uri="{FF2B5EF4-FFF2-40B4-BE49-F238E27FC236}">
-                <a16:creationId xmlns:a16="http://schemas.microsoft.com/office/drawing/2014/main" id="{2A1A9CE2-A825-4C4E-B2DA-537B6B482230}"/>
-              </a:ext>
-            </a:extLst>
-          </p:cNvPr>
-          <p:cNvSpPr>
-            <a:spLocks noGrp="1"/>
-          </p:cNvSpPr>
-          <p:nvPr>
-            <p:ph type="ctrTitle"/>
-          </p:nvPr>
-        </p:nvSpPr>
-        <p:spPr/>
-        <p:txBody>
-          <a:bodyPr/>
-          <a:lstStyle/>
-          <a:p>
-            <a:r>
-              <a:rPr lang="de-CH" dirty="0"/>
-              <a:t>Implementierte </a:t>
-            </a:r>
-            <a:r>
-              <a:rPr lang="de-CH" dirty="0" err="1"/>
-              <a:t>features</a:t>
-            </a:r>
-            <a:endParaRPr lang="de-CH" dirty="0"/>
-          </a:p>
-        </p:txBody>
-      </p:sp>
-      <p:sp>
-        <p:nvSpPr>
-          <p:cNvPr id="4" name="Inhaltsplatzhalter 3">
-            <a:extLst>
-              <a:ext uri="{FF2B5EF4-FFF2-40B4-BE49-F238E27FC236}">
-                <a16:creationId xmlns:a16="http://schemas.microsoft.com/office/drawing/2014/main" id="{617709DA-EACF-4B4F-8764-8FD3AF31F6A1}"/>
-              </a:ext>
-            </a:extLst>
-          </p:cNvPr>
-          <p:cNvSpPr>
-            <a:spLocks noGrp="1"/>
-          </p:cNvSpPr>
-          <p:nvPr>
-            <p:ph sz="half" idx="1"/>
-          </p:nvPr>
-        </p:nvSpPr>
-        <p:spPr/>
-        <p:txBody>
-          <a:bodyPr/>
-          <a:lstStyle/>
-          <a:p>
-            <a:r>
-              <a:rPr lang="de-DE" dirty="0"/>
-              <a:t>Web-Applikation zum Thema Patienten-Management-System</a:t>
-            </a:r>
-          </a:p>
-          <a:p>
-            <a:r>
-              <a:rPr lang="de-DE" dirty="0"/>
-              <a:t> Das Ziel ist den Arzt bei der Behandlung von Patienten mit Suchterkrankungen zu unterstützen. </a:t>
-            </a:r>
-          </a:p>
-          <a:p>
-            <a:r>
-              <a:rPr lang="de-DE" dirty="0"/>
-              <a:t>Übergeordnete Ziele sind die Behandlung der Patienten zu erleichtern indem Informationen rechtzeitig dem Arzt zur Verfügung gestellt werden, sowie die Unterstützung von Patienten und deren Angehörigen bei der Bewältigung der Erkrankung. </a:t>
-            </a:r>
-          </a:p>
-          <a:p>
-            <a:endParaRPr lang="de-DE" dirty="0"/>
-          </a:p>
-          <a:p>
-            <a:pPr marL="0" indent="0">
-              <a:buNone/>
-            </a:pPr>
-            <a:r>
-              <a:rPr lang="de-CH" b="1" dirty="0"/>
-              <a:t>Hauptfunktionen</a:t>
-            </a:r>
-            <a:r>
-              <a:rPr lang="de-CH" dirty="0"/>
-              <a:t> </a:t>
-            </a:r>
-          </a:p>
-          <a:p>
-            <a:r>
-              <a:rPr lang="de-CH" dirty="0"/>
-              <a:t>Patientenaufnahme </a:t>
-            </a:r>
-          </a:p>
-          <a:p>
-            <a:r>
-              <a:rPr lang="de-CH" dirty="0"/>
-              <a:t>Medikation </a:t>
-            </a:r>
-          </a:p>
-          <a:p>
-            <a:r>
-              <a:rPr lang="de-CH" dirty="0"/>
-              <a:t>Terminplanung </a:t>
-            </a:r>
-          </a:p>
-          <a:p>
-            <a:endParaRPr lang="de-CH" dirty="0"/>
-          </a:p>
-        </p:txBody>
-      </p:sp>
-    </p:spTree>
-    <p:extLst>
-      <p:ext uri="{BB962C8B-B14F-4D97-AF65-F5344CB8AC3E}">
-        <p14:creationId xmlns:p14="http://schemas.microsoft.com/office/powerpoint/2010/main" val="1385483464"/>
-      </p:ext>
-    </p:extLst>
-  </p:cSld>
-  <p:clrMapOvr>
-    <a:masterClrMapping/>
-  </p:clrMapOvr>
-</p:sld>
-</file>
-
-<file path=ppt/slides/slide5.xml><?xml version="1.0" encoding="utf-8"?>
-<p:sld xmlns:a="http://schemas.openxmlformats.org/drawingml/2006/main" xmlns:r="http://schemas.openxmlformats.org/officeDocument/2006/relationships" xmlns:p="http://schemas.openxmlformats.org/presentationml/2006/main">
-  <p:cSld>
-    <p:spTree>
-      <p:nvGrpSpPr>
-        <p:cNvPr id="1" name=""/>
-        <p:cNvGrpSpPr/>
-        <p:nvPr/>
-      </p:nvGrpSpPr>
-      <p:grpSpPr>
-        <a:xfrm>
-          <a:off x="0" y="0"/>
-          <a:ext cx="0" cy="0"/>
-          <a:chOff x="0" y="0"/>
-          <a:chExt cx="0" cy="0"/>
-        </a:xfrm>
-      </p:grpSpPr>
-      <p:sp>
-        <p:nvSpPr>
-          <p:cNvPr id="3" name="Titel 2">
-            <a:extLst>
-              <a:ext uri="{FF2B5EF4-FFF2-40B4-BE49-F238E27FC236}">
-                <a16:creationId xmlns:a16="http://schemas.microsoft.com/office/drawing/2014/main" id="{2A1A9CE2-A825-4C4E-B2DA-537B6B482230}"/>
-              </a:ext>
-            </a:extLst>
-          </p:cNvPr>
-          <p:cNvSpPr>
-            <a:spLocks noGrp="1"/>
-          </p:cNvSpPr>
-          <p:nvPr>
-            <p:ph type="ctrTitle"/>
-          </p:nvPr>
-        </p:nvSpPr>
-        <p:spPr/>
-        <p:txBody>
-          <a:bodyPr/>
-          <a:lstStyle/>
-          <a:p>
-            <a:r>
-              <a:rPr lang="de-CH" dirty="0"/>
-              <a:t>Implementierte </a:t>
-            </a:r>
-            <a:r>
-              <a:rPr lang="de-CH" dirty="0" err="1"/>
-              <a:t>features</a:t>
-            </a:r>
-            <a:endParaRPr lang="de-CH" dirty="0"/>
-          </a:p>
-        </p:txBody>
-      </p:sp>
-      <p:sp>
-        <p:nvSpPr>
-          <p:cNvPr id="4" name="Inhaltsplatzhalter 3">
-            <a:extLst>
-              <a:ext uri="{FF2B5EF4-FFF2-40B4-BE49-F238E27FC236}">
-                <a16:creationId xmlns:a16="http://schemas.microsoft.com/office/drawing/2014/main" id="{617709DA-EACF-4B4F-8764-8FD3AF31F6A1}"/>
-              </a:ext>
-            </a:extLst>
-          </p:cNvPr>
-          <p:cNvSpPr>
-            <a:spLocks noGrp="1"/>
-          </p:cNvSpPr>
-          <p:nvPr>
-            <p:ph sz="half" idx="1"/>
-          </p:nvPr>
-        </p:nvSpPr>
-        <p:spPr/>
-        <p:txBody>
-          <a:bodyPr/>
-          <a:lstStyle/>
-          <a:p>
-            <a:pPr marL="0" indent="0">
-              <a:buNone/>
-            </a:pPr>
-            <a:r>
-              <a:rPr lang="de-CH" b="1" dirty="0"/>
-              <a:t>Funktionale Benutzeranforderungen </a:t>
-            </a:r>
-          </a:p>
-          <a:p>
-            <a:r>
-              <a:rPr lang="de-DE" dirty="0"/>
-              <a:t>Benutzer kann Patienten im System erfassen und Daten eingeben </a:t>
-            </a:r>
-          </a:p>
-          <a:p>
-            <a:r>
-              <a:rPr lang="de-DE" dirty="0"/>
-              <a:t>Benutzer kann Patientendaten – wenn freigegeben – aus EPD abrufen o Die EPD Anbindung wird simuliert </a:t>
-            </a:r>
-            <a:endParaRPr lang="de-CH" dirty="0"/>
-          </a:p>
-          <a:p>
-            <a:r>
-              <a:rPr lang="de-DE" dirty="0"/>
-              <a:t>Benutzer kann Medikamente verschreiben o Die Anbindung ans </a:t>
-            </a:r>
-            <a:r>
-              <a:rPr lang="de-DE" dirty="0" err="1"/>
-              <a:t>hospINDEX</a:t>
-            </a:r>
-            <a:r>
-              <a:rPr lang="de-DE" dirty="0"/>
-              <a:t> wird simuliert </a:t>
-            </a:r>
-            <a:endParaRPr lang="de-CH" dirty="0"/>
-          </a:p>
-          <a:p>
-            <a:r>
-              <a:rPr lang="de-DE" dirty="0"/>
-              <a:t>Dem Benutzer steht ein Tool zur Verfügung, mit dem er plausibilisieren kann, ob die Medikamente genommen werden </a:t>
-            </a:r>
-          </a:p>
-          <a:p>
-            <a:r>
-              <a:rPr lang="de-DE" dirty="0"/>
-              <a:t>Benutzer kann seine Patiententermine verwalten </a:t>
-            </a:r>
-          </a:p>
-          <a:p>
-            <a:r>
-              <a:rPr lang="de-DE" dirty="0"/>
-              <a:t>Benutzer kann sich </a:t>
-            </a:r>
-            <a:r>
-              <a:rPr lang="de-DE" dirty="0" err="1"/>
-              <a:t>ausserhalb</a:t>
-            </a:r>
-            <a:r>
-              <a:rPr lang="de-DE" dirty="0"/>
-              <a:t> der Organisation in das System einloggen o Keine Authentisierungsmechanismus mit SMS/</a:t>
-            </a:r>
-            <a:r>
-              <a:rPr lang="de-DE" dirty="0" err="1"/>
-              <a:t>mOTP</a:t>
-            </a:r>
-            <a:r>
-              <a:rPr lang="de-DE" dirty="0"/>
-              <a:t>/… etc. wird realisiert </a:t>
-            </a:r>
-            <a:endParaRPr lang="de-CH" dirty="0"/>
-          </a:p>
-          <a:p>
-            <a:r>
-              <a:rPr lang="de-DE" dirty="0"/>
-              <a:t>Benutzer kann vorausgefüllte Formulare ausdrucken </a:t>
-            </a:r>
-          </a:p>
-          <a:p>
-            <a:endParaRPr lang="de-CH" dirty="0"/>
-          </a:p>
-        </p:txBody>
-      </p:sp>
-    </p:spTree>
-    <p:extLst>
-      <p:ext uri="{BB962C8B-B14F-4D97-AF65-F5344CB8AC3E}">
-        <p14:creationId xmlns:p14="http://schemas.microsoft.com/office/powerpoint/2010/main" val="3709174823"/>
-      </p:ext>
-    </p:extLst>
-  </p:cSld>
-  <p:clrMapOvr>
-    <a:masterClrMapping/>
-  </p:clrMapOvr>
-</p:sld>
-</file>
-
-<file path=ppt/slides/slide6.xml><?xml version="1.0" encoding="utf-8"?>
 <p:sld xmlns:a="http://schemas.openxmlformats.org/drawingml/2006/main" xmlns:r="http://schemas.openxmlformats.org/officeDocument/2006/relationships" xmlns:p="http://schemas.openxmlformats.org/presentationml/2006/main">
   <p:cSld>
     <p:spTree>
@@ -9367,7 +9124,7 @@
 </p:sld>
 </file>
 
-<file path=ppt/slides/slide7.xml><?xml version="1.0" encoding="utf-8"?>
+<file path=ppt/slides/slide5.xml><?xml version="1.0" encoding="utf-8"?>
 <p:sld xmlns:a="http://schemas.openxmlformats.org/drawingml/2006/main" xmlns:r="http://schemas.openxmlformats.org/officeDocument/2006/relationships" xmlns:p="http://schemas.openxmlformats.org/presentationml/2006/main">
   <p:cSld>
     <p:spTree>
@@ -9523,7 +9280,7 @@
 </p:sld>
 </file>
 
-<file path=ppt/slides/slide8.xml><?xml version="1.0" encoding="utf-8"?>
+<file path=ppt/slides/slide6.xml><?xml version="1.0" encoding="utf-8"?>
 <p:sld xmlns:a="http://schemas.openxmlformats.org/drawingml/2006/main" xmlns:r="http://schemas.openxmlformats.org/officeDocument/2006/relationships" xmlns:p="http://schemas.openxmlformats.org/presentationml/2006/main">
   <p:cSld>
     <p:spTree>
@@ -9667,7 +9424,7 @@
 </p:sld>
 </file>
 
-<file path=ppt/slides/slide9.xml><?xml version="1.0" encoding="utf-8"?>
+<file path=ppt/slides/slide7.xml><?xml version="1.0" encoding="utf-8"?>
 <p:sld xmlns:a="http://schemas.openxmlformats.org/drawingml/2006/main" xmlns:r="http://schemas.openxmlformats.org/officeDocument/2006/relationships" xmlns:p="http://schemas.openxmlformats.org/presentationml/2006/main">
   <p:cSld>
     <p:spTree>
@@ -9787,6 +9544,158 @@
     <p:extLst>
       <p:ext uri="{BB962C8B-B14F-4D97-AF65-F5344CB8AC3E}">
         <p14:creationId xmlns:p14="http://schemas.microsoft.com/office/powerpoint/2010/main" val="886910423"/>
+      </p:ext>
+    </p:extLst>
+  </p:cSld>
+  <p:clrMapOvr>
+    <a:masterClrMapping/>
+  </p:clrMapOvr>
+</p:sld>
+</file>
+
+<file path=ppt/slides/slide8.xml><?xml version="1.0" encoding="utf-8"?>
+<p:sld xmlns:a="http://schemas.openxmlformats.org/drawingml/2006/main" xmlns:r="http://schemas.openxmlformats.org/officeDocument/2006/relationships" xmlns:p="http://schemas.openxmlformats.org/presentationml/2006/main">
+  <p:cSld>
+    <p:spTree>
+      <p:nvGrpSpPr>
+        <p:cNvPr id="1" name=""/>
+        <p:cNvGrpSpPr/>
+        <p:nvPr/>
+      </p:nvGrpSpPr>
+      <p:grpSpPr>
+        <a:xfrm>
+          <a:off x="0" y="0"/>
+          <a:ext cx="0" cy="0"/>
+          <a:chOff x="0" y="0"/>
+          <a:chExt cx="0" cy="0"/>
+        </a:xfrm>
+      </p:grpSpPr>
+      <p:sp>
+        <p:nvSpPr>
+          <p:cNvPr id="2" name="Inhaltsplatzhalter 1">
+            <a:extLst>
+              <a:ext uri="{FF2B5EF4-FFF2-40B4-BE49-F238E27FC236}">
+                <a16:creationId xmlns:a16="http://schemas.microsoft.com/office/drawing/2014/main" id="{19572D01-E7C4-4B81-9FCD-595177684BEA}"/>
+              </a:ext>
+            </a:extLst>
+          </p:cNvPr>
+          <p:cNvSpPr>
+            <a:spLocks noGrp="1"/>
+          </p:cNvSpPr>
+          <p:nvPr>
+            <p:ph sz="half" idx="1"/>
+          </p:nvPr>
+        </p:nvSpPr>
+        <p:spPr/>
+        <p:txBody>
+          <a:bodyPr/>
+          <a:lstStyle/>
+          <a:p>
+            <a:r>
+              <a:rPr lang="de-CH" dirty="0"/>
+              <a:t>Titelbild: https://image.jimcdn.com/app/cms/image/transf/dimension=697x10000:format=jpg/path/sd47613ceb1db53f4/image/ib674891e8fb5286a/version/1515513892/patientenzimmer-untersuchungszimmer-praxis-hausarzt-friedeck-rothenburg.jpg</a:t>
+            </a:r>
+          </a:p>
+          <a:p>
+            <a:endParaRPr lang="de-CH" dirty="0"/>
+          </a:p>
+        </p:txBody>
+      </p:sp>
+      <p:sp>
+        <p:nvSpPr>
+          <p:cNvPr id="3" name="Titel 2">
+            <a:extLst>
+              <a:ext uri="{FF2B5EF4-FFF2-40B4-BE49-F238E27FC236}">
+                <a16:creationId xmlns:a16="http://schemas.microsoft.com/office/drawing/2014/main" id="{93DE674A-067F-4DB4-9443-098DF8E86245}"/>
+              </a:ext>
+            </a:extLst>
+          </p:cNvPr>
+          <p:cNvSpPr>
+            <a:spLocks noGrp="1"/>
+          </p:cNvSpPr>
+          <p:nvPr>
+            <p:ph type="ctrTitle"/>
+          </p:nvPr>
+        </p:nvSpPr>
+        <p:spPr/>
+        <p:txBody>
+          <a:bodyPr/>
+          <a:lstStyle/>
+          <a:p>
+            <a:r>
+              <a:rPr lang="de-CH" dirty="0"/>
+              <a:t>Bilderquellen</a:t>
+            </a:r>
+          </a:p>
+        </p:txBody>
+      </p:sp>
+    </p:spTree>
+    <p:extLst>
+      <p:ext uri="{BB962C8B-B14F-4D97-AF65-F5344CB8AC3E}">
+        <p14:creationId xmlns:p14="http://schemas.microsoft.com/office/powerpoint/2010/main" val="640674437"/>
+      </p:ext>
+    </p:extLst>
+  </p:cSld>
+  <p:clrMapOvr>
+    <a:masterClrMapping/>
+  </p:clrMapOvr>
+</p:sld>
+</file>
+
+<file path=ppt/slides/slide9.xml><?xml version="1.0" encoding="utf-8"?>
+<p:sld xmlns:a="http://schemas.openxmlformats.org/drawingml/2006/main" xmlns:r="http://schemas.openxmlformats.org/officeDocument/2006/relationships" xmlns:p="http://schemas.openxmlformats.org/presentationml/2006/main">
+  <p:cSld>
+    <p:spTree>
+      <p:nvGrpSpPr>
+        <p:cNvPr id="1" name=""/>
+        <p:cNvGrpSpPr/>
+        <p:nvPr/>
+      </p:nvGrpSpPr>
+      <p:grpSpPr>
+        <a:xfrm>
+          <a:off x="0" y="0"/>
+          <a:ext cx="0" cy="0"/>
+          <a:chOff x="0" y="0"/>
+          <a:chExt cx="0" cy="0"/>
+        </a:xfrm>
+      </p:grpSpPr>
+      <p:sp>
+        <p:nvSpPr>
+          <p:cNvPr id="10" name="Titel 1">
+            <a:extLst>
+              <a:ext uri="{FF2B5EF4-FFF2-40B4-BE49-F238E27FC236}">
+                <a16:creationId xmlns:a16="http://schemas.microsoft.com/office/drawing/2014/main" id="{B70EFBCC-DB23-49EA-8BE3-C6992669D884}"/>
+              </a:ext>
+            </a:extLst>
+          </p:cNvPr>
+          <p:cNvSpPr>
+            <a:spLocks noGrp="1"/>
+          </p:cNvSpPr>
+          <p:nvPr>
+            <p:ph type="ctrTitle"/>
+          </p:nvPr>
+        </p:nvSpPr>
+        <p:spPr>
+          <a:xfrm>
+            <a:off x="457200" y="1839809"/>
+            <a:ext cx="7020000" cy="533105"/>
+          </a:xfrm>
+        </p:spPr>
+        <p:txBody>
+          <a:bodyPr/>
+          <a:lstStyle/>
+          <a:p>
+            <a:r>
+              <a:rPr lang="de-CH" dirty="0"/>
+              <a:t>Anhang</a:t>
+            </a:r>
+          </a:p>
+        </p:txBody>
+      </p:sp>
+    </p:spTree>
+    <p:extLst>
+      <p:ext uri="{BB962C8B-B14F-4D97-AF65-F5344CB8AC3E}">
+        <p14:creationId xmlns:p14="http://schemas.microsoft.com/office/powerpoint/2010/main" val="1751310171"/>
       </p:ext>
     </p:extLst>
   </p:cSld>
@@ -10416,6 +10325,12 @@
 </file>
 
 <file path=customXml/item2.xml><?xml version="1.0" encoding="utf-8"?>
+<p:properties xmlns:p="http://schemas.microsoft.com/office/2006/metadata/properties" xmlns:xsi="http://www.w3.org/2001/XMLSchema-instance" xmlns:pc="http://schemas.microsoft.com/office/infopath/2007/PartnerControls">
+  <documentManagement/>
+</p:properties>
+</file>
+
+<file path=customXml/item3.xml><?xml version="1.0" encoding="utf-8"?>
 <ct:contentTypeSchema xmlns:ct="http://schemas.microsoft.com/office/2006/metadata/contentType" xmlns:ma="http://schemas.microsoft.com/office/2006/metadata/properties/metaAttributes" ct:_="" ma:_="" ma:contentTypeName="Dokument" ma:contentTypeID="0x010100D78F6B955CE49741A0DA794E1BD19823" ma:contentTypeVersion="2" ma:contentTypeDescription="Ein neues Dokument erstellen." ma:contentTypeScope="" ma:versionID="b38c4b257f07a2bbe2e881e426cae38b">
   <xsd:schema xmlns:xsd="http://www.w3.org/2001/XMLSchema" xmlns:xs="http://www.w3.org/2001/XMLSchema" xmlns:p="http://schemas.microsoft.com/office/2006/metadata/properties" xmlns:ns3="de7f4a71-b510-446a-a776-c787f58d5553" targetNamespace="http://schemas.microsoft.com/office/2006/metadata/properties" ma:root="true" ma:fieldsID="98d1d1f20bcd69e07f996ac788fb9573" ns3:_="">
     <xsd:import namespace="de7f4a71-b510-446a-a776-c787f58d5553"/>
@@ -10547,12 +10462,6 @@
 </ct:contentTypeSchema>
 </file>
 
-<file path=customXml/item3.xml><?xml version="1.0" encoding="utf-8"?>
-<p:properties xmlns:p="http://schemas.microsoft.com/office/2006/metadata/properties" xmlns:xsi="http://www.w3.org/2001/XMLSchema-instance" xmlns:pc="http://schemas.microsoft.com/office/infopath/2007/PartnerControls">
-  <documentManagement/>
-</p:properties>
-</file>
-
 <file path=customXml/itemProps1.xml><?xml version="1.0" encoding="utf-8"?>
 <ds:datastoreItem xmlns:ds="http://schemas.openxmlformats.org/officeDocument/2006/customXml" ds:itemID="{7D2542CC-467A-4770-BDA7-ADCFF09F6DBF}">
   <ds:schemaRefs>
@@ -10562,6 +10471,22 @@
 </file>
 
 <file path=customXml/itemProps2.xml><?xml version="1.0" encoding="utf-8"?>
+<ds:datastoreItem xmlns:ds="http://schemas.openxmlformats.org/officeDocument/2006/customXml" ds:itemID="{66985437-8812-4ABE-89CE-3E49C89E0BF6}">
+  <ds:schemaRefs>
+    <ds:schemaRef ds:uri="de7f4a71-b510-446a-a776-c787f58d5553"/>
+    <ds:schemaRef ds:uri="http://schemas.openxmlformats.org/package/2006/metadata/core-properties"/>
+    <ds:schemaRef ds:uri="http://schemas.microsoft.com/office/2006/metadata/properties"/>
+    <ds:schemaRef ds:uri="http://purl.org/dc/terms/"/>
+    <ds:schemaRef ds:uri="http://purl.org/dc/dcmitype/"/>
+    <ds:schemaRef ds:uri="http://purl.org/dc/elements/1.1/"/>
+    <ds:schemaRef ds:uri="http://schemas.microsoft.com/office/infopath/2007/PartnerControls"/>
+    <ds:schemaRef ds:uri="http://schemas.microsoft.com/office/2006/documentManagement/types"/>
+    <ds:schemaRef ds:uri="http://www.w3.org/XML/1998/namespace"/>
+  </ds:schemaRefs>
+</ds:datastoreItem>
+</file>
+
+<file path=customXml/itemProps3.xml><?xml version="1.0" encoding="utf-8"?>
 <ds:datastoreItem xmlns:ds="http://schemas.openxmlformats.org/officeDocument/2006/customXml" ds:itemID="{0626A31D-3B82-488A-B68B-0B333E20C417}">
   <ds:schemaRefs>
     <ds:schemaRef ds:uri="http://schemas.microsoft.com/office/2006/metadata/contentType"/>
@@ -10577,20 +10502,4 @@
     <ds:schemaRef ds:uri="http://schemas.microsoft.com/internal/obd"/>
   </ds:schemaRefs>
 </ds:datastoreItem>
-</file>
-
-<file path=customXml/itemProps3.xml><?xml version="1.0" encoding="utf-8"?>
-<ds:datastoreItem xmlns:ds="http://schemas.openxmlformats.org/officeDocument/2006/customXml" ds:itemID="{66985437-8812-4ABE-89CE-3E49C89E0BF6}">
-  <ds:schemaRefs>
-    <ds:schemaRef ds:uri="de7f4a71-b510-446a-a776-c787f58d5553"/>
-    <ds:schemaRef ds:uri="http://schemas.openxmlformats.org/package/2006/metadata/core-properties"/>
-    <ds:schemaRef ds:uri="http://schemas.microsoft.com/office/2006/metadata/properties"/>
-    <ds:schemaRef ds:uri="http://purl.org/dc/terms/"/>
-    <ds:schemaRef ds:uri="http://purl.org/dc/dcmitype/"/>
-    <ds:schemaRef ds:uri="http://purl.org/dc/elements/1.1/"/>
-    <ds:schemaRef ds:uri="http://schemas.microsoft.com/office/infopath/2007/PartnerControls"/>
-    <ds:schemaRef ds:uri="http://schemas.microsoft.com/office/2006/documentManagement/types"/>
-    <ds:schemaRef ds:uri="http://www.w3.org/XML/1998/namespace"/>
-  </ds:schemaRefs>
-</ds:datastoreItem>
 </file>
</xml_diff>